<commit_message>
refactor: flatten skills directory structure and enhance pptx docs
- Move generator skills up one level (remove word/pdf/presentation folders)
- Reorganize .claude/skills/ for simpler navigation
- Add comprehensive OOXML placeholder inheritance documentation to pptx-generator
- Include .DS_Store files (should be gitignored in future)
</commit_message>
<xml_diff>
--- a/storage/starter-templates/pptx/professional-course-template-v1.0.pptx
+++ b/storage/starter-templates/pptx/professional-course-template-v1.0.pptx
@@ -59,15 +59,19 @@
         </p:spPr>
         <p:txBody>
           <a:bodyPr anchor="ctr"/>
-          <a:lstStyle/>
-          <a:p>
-            <a:pPr algn="ctr"/>
-            <a:r>
-              <a:rPr lang="en-US" sz="4400" b="1">
+          <a:lstStyle>
+            <a:lvl1pPr algn="ctr">
+              <a:buNone/>
+              <a:defRPr sz="4400" b="1">
                 <a:solidFill>
                   <a:srgbClr val="FFFFFF"/>
                 </a:solidFill>
-              </a:rPr>
+              </a:defRPr>
+            </a:lvl1pPr>
+          </a:lstStyle>
+          <a:p>
+            <a:r>
+              <a:rPr lang="en-US"/>
               <a:t>{{course_title}}</a:t>
             </a:r>
           </a:p>
@@ -94,15 +98,19 @@
         </p:spPr>
         <p:txBody>
           <a:bodyPr anchor="ctr"/>
-          <a:lstStyle/>
-          <a:p>
-            <a:pPr algn="ctr"/>
-            <a:r>
-              <a:rPr lang="en-US" sz="2000">
+          <a:lstStyle>
+            <a:lvl1pPr algn="ctr">
+              <a:buNone/>
+              <a:defRPr sz="2000">
                 <a:solidFill>
                   <a:srgbClr val="F5F5F5"/>
                 </a:solidFill>
-              </a:rPr>
+              </a:defRPr>
+            </a:lvl1pPr>
+          </a:lstStyle>
+          <a:p>
+            <a:r>
+              <a:rPr lang="en-US"/>
               <a:t>{{course_subtitle}}</a:t>
             </a:r>
           </a:p>
@@ -110,9 +118,13 @@
       </p:sp>
       <p:sp>
         <p:nvSpPr>
-          <p:cNvPr id="4" name="TextBox 4"/>
-          <p:cNvSpPr txBox="1"/>
-          <p:nvPr/>
+          <p:cNvPr id="4" name="body 4"/>
+          <p:cNvSpPr>
+            <a:spLocks noGrp="1"/>
+          </p:cNvSpPr>
+          <p:nvPr>
+            <p:ph type="body" idx="2"/>
+          </p:nvPr>
         </p:nvSpPr>
         <p:spPr>
           <a:xfrm>
@@ -122,19 +134,22 @@
           <a:prstGeom prst="rect">
             <a:avLst/>
           </a:prstGeom>
-          <a:noFill/>
         </p:spPr>
         <p:txBody>
           <a:bodyPr anchor="ctr"/>
-          <a:lstStyle/>
-          <a:p>
-            <a:pPr algn="l"/>
-            <a:r>
-              <a:rPr lang="en-US" sz="1400">
+          <a:lstStyle>
+            <a:lvl1pPr algn="l">
+              <a:buNone/>
+              <a:defRPr sz="1400">
                 <a:solidFill>
                   <a:srgbClr val="F5F5F5"/>
                 </a:solidFill>
-              </a:rPr>
+              </a:defRPr>
+            </a:lvl1pPr>
+          </a:lstStyle>
+          <a:p>
+            <a:r>
+              <a:rPr lang="en-US"/>
               <a:t>Instructor: {{instructor_name}}</a:t>
             </a:r>
           </a:p>
@@ -142,9 +157,13 @@
       </p:sp>
       <p:sp>
         <p:nvSpPr>
-          <p:cNvPr id="5" name="TextBox 5"/>
-          <p:cNvSpPr txBox="1"/>
-          <p:nvPr/>
+          <p:cNvPr id="5" name="body 5"/>
+          <p:cNvSpPr>
+            <a:spLocks noGrp="1"/>
+          </p:cNvSpPr>
+          <p:nvPr>
+            <p:ph type="body" idx="3"/>
+          </p:nvPr>
         </p:nvSpPr>
         <p:spPr>
           <a:xfrm>
@@ -154,19 +173,22 @@
           <a:prstGeom prst="rect">
             <a:avLst/>
           </a:prstGeom>
-          <a:noFill/>
         </p:spPr>
         <p:txBody>
           <a:bodyPr anchor="ctr"/>
-          <a:lstStyle/>
-          <a:p>
-            <a:pPr algn="r"/>
-            <a:r>
-              <a:rPr lang="en-US" sz="1400">
+          <a:lstStyle>
+            <a:lvl1pPr algn="r">
+              <a:buNone/>
+              <a:defRPr sz="1400">
                 <a:solidFill>
                   <a:srgbClr val="F5F5F5"/>
                 </a:solidFill>
-              </a:rPr>
+              </a:defRPr>
+            </a:lvl1pPr>
+          </a:lstStyle>
+          <a:p>
+            <a:r>
+              <a:rPr lang="en-US"/>
               <a:t>{{course_date}}</a:t>
             </a:r>
           </a:p>
@@ -211,15 +233,19 @@
         </p:spPr>
         <p:txBody>
           <a:bodyPr anchor="ctr"/>
-          <a:lstStyle/>
-          <a:p>
-            <a:pPr algn="ctr"/>
-            <a:r>
-              <a:rPr lang="en-US" sz="5400" b="1">
+          <a:lstStyle>
+            <a:lvl1pPr algn="ctr">
+              <a:buNone/>
+              <a:defRPr sz="5400" b="1">
                 <a:solidFill>
                   <a:srgbClr val="1B365D"/>
                 </a:solidFill>
-              </a:rPr>
+              </a:defRPr>
+            </a:lvl1pPr>
+          </a:lstStyle>
+          <a:p>
+            <a:r>
+              <a:rPr lang="en-US"/>
               <a:t>{{big_text_content}}</a:t>
             </a:r>
           </a:p>
@@ -271,15 +297,19 @@
         </p:spPr>
         <p:txBody>
           <a:bodyPr anchor="ctr"/>
-          <a:lstStyle/>
-          <a:p>
-            <a:pPr algn="ctr"/>
-            <a:r>
-              <a:rPr lang="en-US" sz="4000" b="1">
+          <a:lstStyle>
+            <a:lvl1pPr algn="ctr">
+              <a:buNone/>
+              <a:defRPr sz="4000" b="1">
                 <a:solidFill>
                   <a:srgbClr val="FFFFFF"/>
                 </a:solidFill>
-              </a:rPr>
+              </a:defRPr>
+            </a:lvl1pPr>
+          </a:lstStyle>
+          <a:p>
+            <a:r>
+              <a:rPr lang="en-US"/>
               <a:t>{{section_title}}</a:t>
             </a:r>
           </a:p>
@@ -306,15 +336,19 @@
         </p:spPr>
         <p:txBody>
           <a:bodyPr anchor="t"/>
-          <a:lstStyle/>
-          <a:p>
-            <a:pPr algn="ctr"/>
-            <a:r>
-              <a:rPr lang="en-US" sz="1800">
+          <a:lstStyle>
+            <a:lvl1pPr algn="ctr">
+              <a:buNone/>
+              <a:defRPr sz="1800">
                 <a:solidFill>
                   <a:srgbClr val="F5F5F5"/>
                 </a:solidFill>
-              </a:rPr>
+              </a:defRPr>
+            </a:lvl1pPr>
+          </a:lstStyle>
+          <a:p>
+            <a:r>
+              <a:rPr lang="en-US"/>
               <a:t>{{section_description}}</a:t>
             </a:r>
           </a:p>
@@ -359,15 +393,19 @@
         </p:spPr>
         <p:txBody>
           <a:bodyPr anchor="b"/>
-          <a:lstStyle/>
-          <a:p>
-            <a:pPr algn="l"/>
-            <a:r>
-              <a:rPr lang="en-US" sz="2800" b="1">
+          <a:lstStyle>
+            <a:lvl1pPr algn="l">
+              <a:buNone/>
+              <a:defRPr sz="2800" b="1">
                 <a:solidFill>
                   <a:srgbClr val="1B365D"/>
                 </a:solidFill>
-              </a:rPr>
+              </a:defRPr>
+            </a:lvl1pPr>
+          </a:lstStyle>
+          <a:p>
+            <a:r>
+              <a:rPr lang="en-US"/>
               <a:t>{{slide_title}}</a:t>
             </a:r>
           </a:p>
@@ -394,15 +432,18 @@
         </p:spPr>
         <p:txBody>
           <a:bodyPr anchor="t"/>
-          <a:lstStyle/>
-          <a:p>
-            <a:pPr algn="l"/>
-            <a:r>
-              <a:rPr lang="en-US" sz="1800">
+          <a:lstStyle>
+            <a:lvl1pPr algn="l">
+              <a:defRPr sz="1800">
                 <a:solidFill>
                   <a:srgbClr val="333333"/>
                 </a:solidFill>
-              </a:rPr>
+              </a:defRPr>
+            </a:lvl1pPr>
+          </a:lstStyle>
+          <a:p>
+            <a:r>
+              <a:rPr lang="en-US"/>
               <a:t>{{main_content}}</a:t>
             </a:r>
           </a:p>
@@ -447,15 +488,19 @@
         </p:spPr>
         <p:txBody>
           <a:bodyPr anchor="b"/>
-          <a:lstStyle/>
-          <a:p>
-            <a:pPr algn="l"/>
-            <a:r>
-              <a:rPr lang="en-US" sz="2800" b="1">
+          <a:lstStyle>
+            <a:lvl1pPr algn="l">
+              <a:buNone/>
+              <a:defRPr sz="2800" b="1">
                 <a:solidFill>
                   <a:srgbClr val="1B365D"/>
                 </a:solidFill>
-              </a:rPr>
+              </a:defRPr>
+            </a:lvl1pPr>
+          </a:lstStyle>
+          <a:p>
+            <a:r>
+              <a:rPr lang="en-US"/>
               <a:t>{{slide_title}}</a:t>
             </a:r>
           </a:p>
@@ -482,15 +527,18 @@
         </p:spPr>
         <p:txBody>
           <a:bodyPr anchor="t"/>
-          <a:lstStyle/>
-          <a:p>
-            <a:pPr algn="l"/>
-            <a:r>
-              <a:rPr lang="en-US" sz="1600">
+          <a:lstStyle>
+            <a:lvl1pPr algn="l">
+              <a:defRPr sz="1600">
                 <a:solidFill>
                   <a:srgbClr val="333333"/>
                 </a:solidFill>
-              </a:rPr>
+              </a:defRPr>
+            </a:lvl1pPr>
+          </a:lstStyle>
+          <a:p>
+            <a:r>
+              <a:rPr lang="en-US"/>
               <a:t>{{left_column}}</a:t>
             </a:r>
           </a:p>
@@ -517,15 +565,18 @@
         </p:spPr>
         <p:txBody>
           <a:bodyPr anchor="t"/>
-          <a:lstStyle/>
-          <a:p>
-            <a:pPr algn="l"/>
-            <a:r>
-              <a:rPr lang="en-US" sz="1600">
+          <a:lstStyle>
+            <a:lvl1pPr algn="l">
+              <a:defRPr sz="1600">
                 <a:solidFill>
                   <a:srgbClr val="333333"/>
                 </a:solidFill>
-              </a:rPr>
+              </a:defRPr>
+            </a:lvl1pPr>
+          </a:lstStyle>
+          <a:p>
+            <a:r>
+              <a:rPr lang="en-US"/>
               <a:t>{{right_column}}</a:t>
             </a:r>
           </a:p>
@@ -570,15 +621,19 @@
         </p:spPr>
         <p:txBody>
           <a:bodyPr anchor="b"/>
-          <a:lstStyle/>
-          <a:p>
-            <a:pPr algn="l"/>
-            <a:r>
-              <a:rPr lang="en-US" sz="2400" b="1">
+          <a:lstStyle>
+            <a:lvl1pPr algn="l">
+              <a:buNone/>
+              <a:defRPr sz="2400" b="1">
                 <a:solidFill>
                   <a:srgbClr val="1B365D"/>
                 </a:solidFill>
-              </a:rPr>
+              </a:defRPr>
+            </a:lvl1pPr>
+          </a:lstStyle>
+          <a:p>
+            <a:r>
+              <a:rPr lang="en-US"/>
               <a:t>{{competency_title}}</a:t>
             </a:r>
           </a:p>
@@ -610,9 +665,13 @@
       </p:sp>
       <p:sp>
         <p:nvSpPr>
-          <p:cNvPr id="4" name="TextBox 4"/>
-          <p:cNvSpPr txBox="1"/>
-          <p:nvPr/>
+          <p:cNvPr id="4" name="body 4"/>
+          <p:cNvSpPr>
+            <a:spLocks noGrp="1"/>
+          </p:cNvSpPr>
+          <p:nvPr>
+            <p:ph type="body" idx="1"/>
+          </p:nvPr>
         </p:nvSpPr>
         <p:spPr>
           <a:xfrm>
@@ -622,19 +681,22 @@
           <a:prstGeom prst="rect">
             <a:avLst/>
           </a:prstGeom>
-          <a:noFill/>
         </p:spPr>
         <p:txBody>
           <a:bodyPr anchor="ctr"/>
-          <a:lstStyle/>
-          <a:p>
-            <a:pPr algn="l"/>
-            <a:r>
-              <a:rPr lang="en-US" sz="1600">
+          <a:lstStyle>
+            <a:lvl1pPr algn="l">
+              <a:buNone/>
+              <a:defRPr sz="1600">
                 <a:solidFill>
                   <a:srgbClr val="333333"/>
                 </a:solidFill>
-              </a:rPr>
+              </a:defRPr>
+            </a:lvl1pPr>
+          </a:lstStyle>
+          <a:p>
+            <a:r>
+              <a:rPr lang="en-US"/>
               <a:t>{{competency_description}}</a:t>
             </a:r>
           </a:p>
@@ -679,7 +741,7 @@
             <a:spLocks noGrp="1"/>
           </p:cNvSpPr>
           <p:nvPr>
-            <p:ph type="body" idx="1"/>
+            <p:ph type="body" idx="2"/>
           </p:nvPr>
         </p:nvSpPr>
         <p:spPr>
@@ -693,15 +755,18 @@
         </p:spPr>
         <p:txBody>
           <a:bodyPr anchor="t"/>
-          <a:lstStyle/>
-          <a:p>
-            <a:pPr algn="l"/>
-            <a:r>
-              <a:rPr lang="en-US" sz="1600">
+          <a:lstStyle>
+            <a:lvl1pPr algn="l">
+              <a:defRPr sz="1600">
                 <a:solidFill>
                   <a:srgbClr val="333333"/>
                 </a:solidFill>
-              </a:rPr>
+              </a:defRPr>
+            </a:lvl1pPr>
+          </a:lstStyle>
+          <a:p>
+            <a:r>
+              <a:rPr lang="en-US"/>
               <a:t>{{learning_objectives}}</a:t>
             </a:r>
           </a:p>
@@ -778,15 +843,19 @@
         </p:spPr>
         <p:txBody>
           <a:bodyPr anchor="b"/>
-          <a:lstStyle/>
-          <a:p>
-            <a:pPr algn="l"/>
-            <a:r>
-              <a:rPr lang="en-US" sz="2400" b="1">
+          <a:lstStyle>
+            <a:lvl1pPr algn="l">
+              <a:buNone/>
+              <a:defRPr sz="2400" b="1">
                 <a:solidFill>
                   <a:srgbClr val="1B365D"/>
                 </a:solidFill>
-              </a:rPr>
+              </a:defRPr>
+            </a:lvl1pPr>
+          </a:lstStyle>
+          <a:p>
+            <a:r>
+              <a:rPr lang="en-US"/>
               <a:t>{{activity_title}}</a:t>
             </a:r>
           </a:p>
@@ -845,15 +914,18 @@
         </p:spPr>
         <p:txBody>
           <a:bodyPr anchor="t"/>
-          <a:lstStyle/>
-          <a:p>
-            <a:pPr algn="l"/>
-            <a:r>
-              <a:rPr lang="en-US" sz="1600">
+          <a:lstStyle>
+            <a:lvl1pPr algn="l">
+              <a:defRPr sz="1600">
                 <a:solidFill>
                   <a:srgbClr val="333333"/>
                 </a:solidFill>
-              </a:rPr>
+              </a:defRPr>
+            </a:lvl1pPr>
+          </a:lstStyle>
+          <a:p>
+            <a:r>
+              <a:rPr lang="en-US"/>
               <a:t>{{activity_instructions}}</a:t>
             </a:r>
           </a:p>
@@ -885,9 +957,13 @@
       </p:sp>
       <p:sp>
         <p:nvSpPr>
-          <p:cNvPr id="7" name="TextBox 7"/>
-          <p:cNvSpPr txBox="1"/>
-          <p:nvPr/>
+          <p:cNvPr id="7" name="body 7"/>
+          <p:cNvSpPr>
+            <a:spLocks noGrp="1"/>
+          </p:cNvSpPr>
+          <p:nvPr>
+            <p:ph type="body" idx="2"/>
+          </p:nvPr>
         </p:nvSpPr>
         <p:spPr>
           <a:xfrm>
@@ -897,19 +973,22 @@
           <a:prstGeom prst="rect">
             <a:avLst/>
           </a:prstGeom>
-          <a:noFill/>
         </p:spPr>
         <p:txBody>
           <a:bodyPr anchor="ctr"/>
-          <a:lstStyle/>
-          <a:p>
-            <a:pPr algn="ctr"/>
-            <a:r>
-              <a:rPr lang="en-US" sz="1800" b="1">
+          <a:lstStyle>
+            <a:lvl1pPr algn="ctr">
+              <a:buNone/>
+              <a:defRPr sz="1800" b="1">
                 <a:solidFill>
                   <a:srgbClr val="1B365D"/>
                 </a:solidFill>
-              </a:rPr>
+              </a:defRPr>
+            </a:lvl1pPr>
+          </a:lstStyle>
+          <a:p>
+            <a:r>
+              <a:rPr lang="en-US"/>
               <a:t>{{time_estimate}} min</a:t>
             </a:r>
           </a:p>
@@ -949,9 +1028,13 @@
       </p:sp>
       <p:sp>
         <p:nvSpPr>
-          <p:cNvPr id="9" name="TextBox 9"/>
-          <p:cNvSpPr txBox="1"/>
-          <p:nvPr/>
+          <p:cNvPr id="9" name="body 9"/>
+          <p:cNvSpPr>
+            <a:spLocks noGrp="1"/>
+          </p:cNvSpPr>
+          <p:nvPr>
+            <p:ph type="body" idx="3"/>
+          </p:nvPr>
         </p:nvSpPr>
         <p:spPr>
           <a:xfrm>
@@ -961,19 +1044,22 @@
           <a:prstGeom prst="rect">
             <a:avLst/>
           </a:prstGeom>
-          <a:noFill/>
         </p:spPr>
         <p:txBody>
           <a:bodyPr anchor="t"/>
-          <a:lstStyle/>
-          <a:p>
-            <a:pPr algn="l"/>
-            <a:r>
-              <a:rPr lang="en-US" sz="1400">
+          <a:lstStyle>
+            <a:lvl1pPr algn="l">
+              <a:buNone/>
+              <a:defRPr sz="1400">
                 <a:solidFill>
                   <a:srgbClr val="333333"/>
                 </a:solidFill>
-              </a:rPr>
+              </a:defRPr>
+            </a:lvl1pPr>
+          </a:lstStyle>
+          <a:p>
+            <a:r>
+              <a:rPr lang="en-US"/>
               <a:t>{{materials_needed}}</a:t>
             </a:r>
           </a:p>
@@ -1018,15 +1104,19 @@
         </p:spPr>
         <p:txBody>
           <a:bodyPr anchor="b"/>
-          <a:lstStyle/>
-          <a:p>
-            <a:pPr algn="l"/>
-            <a:r>
-              <a:rPr lang="en-US" sz="2400" b="1">
+          <a:lstStyle>
+            <a:lvl1pPr algn="l">
+              <a:buNone/>
+              <a:defRPr sz="2400" b="1">
                 <a:solidFill>
                   <a:srgbClr val="1B365D"/>
                 </a:solidFill>
-              </a:rPr>
+              </a:defRPr>
+            </a:lvl1pPr>
+          </a:lstStyle>
+          <a:p>
+            <a:r>
+              <a:rPr lang="en-US"/>
               <a:t>Discussion</a:t>
             </a:r>
           </a:p>
@@ -1056,9 +1146,13 @@
       </p:sp>
       <p:sp>
         <p:nvSpPr>
-          <p:cNvPr id="4" name="TextBox 4"/>
-          <p:cNvSpPr txBox="1"/>
-          <p:nvPr/>
+          <p:cNvPr id="4" name="body 4"/>
+          <p:cNvSpPr>
+            <a:spLocks noGrp="1"/>
+          </p:cNvSpPr>
+          <p:nvPr>
+            <p:ph type="body" idx="1"/>
+          </p:nvPr>
         </p:nvSpPr>
         <p:spPr>
           <a:xfrm>
@@ -1068,19 +1162,22 @@
           <a:prstGeom prst="rect">
             <a:avLst/>
           </a:prstGeom>
-          <a:noFill/>
         </p:spPr>
         <p:txBody>
           <a:bodyPr anchor="ctr"/>
-          <a:lstStyle/>
-          <a:p>
-            <a:pPr algn="l"/>
-            <a:r>
-              <a:rPr lang="en-US" sz="2000">
+          <a:lstStyle>
+            <a:lvl1pPr algn="l">
+              <a:buNone/>
+              <a:defRPr sz="2000">
                 <a:solidFill>
                   <a:srgbClr val="333333"/>
                 </a:solidFill>
-              </a:rPr>
+              </a:defRPr>
+            </a:lvl1pPr>
+          </a:lstStyle>
+          <a:p>
+            <a:r>
+              <a:rPr lang="en-US"/>
               <a:t>{{discussion_prompt}}</a:t>
             </a:r>
           </a:p>
@@ -1125,7 +1222,7 @@
             <a:spLocks noGrp="1"/>
           </p:cNvSpPr>
           <p:nvPr>
-            <p:ph type="body" idx="1"/>
+            <p:ph type="body" idx="2"/>
           </p:nvPr>
         </p:nvSpPr>
         <p:spPr>
@@ -1139,15 +1236,18 @@
         </p:spPr>
         <p:txBody>
           <a:bodyPr anchor="t"/>
-          <a:lstStyle/>
-          <a:p>
-            <a:pPr algn="l"/>
-            <a:r>
-              <a:rPr lang="en-US" sz="1600">
+          <a:lstStyle>
+            <a:lvl1pPr algn="l">
+              <a:defRPr sz="1600">
                 <a:solidFill>
                   <a:srgbClr val="333333"/>
                 </a:solidFill>
-              </a:rPr>
+              </a:defRPr>
+            </a:lvl1pPr>
+          </a:lstStyle>
+          <a:p>
+            <a:r>
+              <a:rPr lang="en-US"/>
               <a:t>{{discussion_points}}</a:t>
             </a:r>
           </a:p>
@@ -1155,9 +1255,13 @@
       </p:sp>
       <p:sp>
         <p:nvSpPr>
-          <p:cNvPr id="7" name="TextBox 7"/>
-          <p:cNvSpPr txBox="1"/>
-          <p:nvPr/>
+          <p:cNvPr id="7" name="body 7"/>
+          <p:cNvSpPr>
+            <a:spLocks noGrp="1"/>
+          </p:cNvSpPr>
+          <p:nvPr>
+            <p:ph type="body" idx="3"/>
+          </p:nvPr>
         </p:nvSpPr>
         <p:spPr>
           <a:xfrm>
@@ -1167,19 +1271,22 @@
           <a:prstGeom prst="rect">
             <a:avLst/>
           </a:prstGeom>
-          <a:noFill/>
         </p:spPr>
         <p:txBody>
           <a:bodyPr anchor="t"/>
-          <a:lstStyle/>
-          <a:p>
-            <a:pPr algn="l"/>
-            <a:r>
-              <a:rPr lang="en-US" sz="1200" i="1">
+          <a:lstStyle>
+            <a:lvl1pPr algn="l">
+              <a:buNone/>
+              <a:defRPr sz="1200">
                 <a:solidFill>
                   <a:srgbClr val="666666"/>
                 </a:solidFill>
-              </a:rPr>
+              </a:defRPr>
+            </a:lvl1pPr>
+          </a:lstStyle>
+          <a:p>
+            <a:r>
+              <a:rPr lang="en-US"/>
               <a:t>Teaching Notes: {{teaching_notes}}</a:t>
             </a:r>
           </a:p>
@@ -1256,15 +1363,19 @@
         </p:spPr>
         <p:txBody>
           <a:bodyPr anchor="ctr"/>
-          <a:lstStyle/>
-          <a:p>
-            <a:pPr algn="ctr"/>
-            <a:r>
-              <a:rPr lang="en-US" sz="3200">
+          <a:lstStyle>
+            <a:lvl1pPr algn="ctr">
+              <a:buNone/>
+              <a:defRPr sz="3200">
                 <a:solidFill>
                   <a:srgbClr val="333333"/>
                 </a:solidFill>
-              </a:rPr>
+              </a:defRPr>
+            </a:lvl1pPr>
+          </a:lstStyle>
+          <a:p>
+            <a:r>
+              <a:rPr lang="en-US"/>
               <a:t>{{quote_text}}</a:t>
             </a:r>
           </a:p>
@@ -1272,9 +1383,13 @@
       </p:sp>
       <p:sp>
         <p:nvSpPr>
-          <p:cNvPr id="4" name="TextBox 4"/>
-          <p:cNvSpPr txBox="1"/>
-          <p:nvPr/>
+          <p:cNvPr id="4" name="body 4"/>
+          <p:cNvSpPr>
+            <a:spLocks noGrp="1"/>
+          </p:cNvSpPr>
+          <p:nvPr>
+            <p:ph type="body" idx="2"/>
+          </p:nvPr>
         </p:nvSpPr>
         <p:spPr>
           <a:xfrm>
@@ -1284,19 +1399,22 @@
           <a:prstGeom prst="rect">
             <a:avLst/>
           </a:prstGeom>
-          <a:noFill/>
         </p:spPr>
         <p:txBody>
           <a:bodyPr anchor="t"/>
-          <a:lstStyle/>
-          <a:p>
-            <a:pPr algn="r"/>
-            <a:r>
-              <a:rPr lang="en-US" sz="1800" i="1">
+          <a:lstStyle>
+            <a:lvl1pPr algn="r">
+              <a:buNone/>
+              <a:defRPr sz="1800">
                 <a:solidFill>
                   <a:srgbClr val="666666"/>
                 </a:solidFill>
-              </a:rPr>
+              </a:defRPr>
+            </a:lvl1pPr>
+          </a:lstStyle>
+          <a:p>
+            <a:r>
+              <a:rPr lang="en-US"/>
               <a:t>— {{attribution}}</a:t>
             </a:r>
           </a:p>
@@ -1364,9 +1482,13 @@
       </p:sp>
       <p:sp>
         <p:nvSpPr>
-          <p:cNvPr id="3" name="TextBox 3"/>
-          <p:cNvSpPr txBox="1"/>
-          <p:nvPr/>
+          <p:cNvPr id="3" name="body 3"/>
+          <p:cNvSpPr>
+            <a:spLocks noGrp="1"/>
+          </p:cNvSpPr>
+          <p:nvPr>
+            <p:ph type="body" idx="2"/>
+          </p:nvPr>
         </p:nvSpPr>
         <p:spPr>
           <a:xfrm>
@@ -1376,19 +1498,22 @@
           <a:prstGeom prst="rect">
             <a:avLst/>
           </a:prstGeom>
-          <a:noFill/>
         </p:spPr>
         <p:txBody>
           <a:bodyPr anchor="ctr"/>
-          <a:lstStyle/>
-          <a:p>
-            <a:pPr algn="ctr"/>
-            <a:r>
-              <a:rPr lang="en-US" sz="2000">
+          <a:lstStyle>
+            <a:lvl1pPr algn="ctr">
+              <a:buNone/>
+              <a:defRPr sz="2000">
                 <a:solidFill>
                   <a:srgbClr val="FFFFFF"/>
                 </a:solidFill>
-              </a:rPr>
+              </a:defRPr>
+            </a:lvl1pPr>
+          </a:lstStyle>
+          <a:p>
+            <a:r>
+              <a:rPr lang="en-US"/>
               <a:t>{{image_caption}}</a:t>
             </a:r>
           </a:p>
@@ -1564,6 +1689,94 @@
         <p:nvPr/>
       </p:nvGrpSpPr>
       <p:grpSpPr/>
+      <p:sp>
+        <p:nvSpPr>
+          <p:cNvPr id="2" name="ctrTitle 2"/>
+          <p:cNvSpPr>
+            <a:spLocks noGrp="1"/>
+          </p:cNvSpPr>
+          <p:nvPr>
+            <p:ph type="ctrTitle"/>
+          </p:nvPr>
+        </p:nvSpPr>
+        <p:spPr/>
+        <p:txBody>
+          <a:bodyPr/>
+          <a:lstStyle/>
+          <a:p>
+            <a:r>
+              <a:rPr lang="en-US"/>
+              <a:t>{{course_title}}</a:t>
+            </a:r>
+          </a:p>
+        </p:txBody>
+      </p:sp>
+      <p:sp>
+        <p:nvSpPr>
+          <p:cNvPr id="3" name="subTitle 3"/>
+          <p:cNvSpPr>
+            <a:spLocks noGrp="1"/>
+          </p:cNvSpPr>
+          <p:nvPr>
+            <p:ph type="subTitle" idx="1"/>
+          </p:nvPr>
+        </p:nvSpPr>
+        <p:spPr/>
+        <p:txBody>
+          <a:bodyPr/>
+          <a:lstStyle/>
+          <a:p>
+            <a:r>
+              <a:rPr lang="en-US"/>
+              <a:t>{{course_subtitle}}</a:t>
+            </a:r>
+          </a:p>
+        </p:txBody>
+      </p:sp>
+      <p:sp>
+        <p:nvSpPr>
+          <p:cNvPr id="4" name="body 4"/>
+          <p:cNvSpPr>
+            <a:spLocks noGrp="1"/>
+          </p:cNvSpPr>
+          <p:nvPr>
+            <p:ph type="body" idx="2"/>
+          </p:nvPr>
+        </p:nvSpPr>
+        <p:spPr/>
+        <p:txBody>
+          <a:bodyPr/>
+          <a:lstStyle/>
+          <a:p>
+            <a:r>
+              <a:rPr lang="en-US"/>
+              <a:t>Instructor: {{instructor_name}}</a:t>
+            </a:r>
+          </a:p>
+        </p:txBody>
+      </p:sp>
+      <p:sp>
+        <p:nvSpPr>
+          <p:cNvPr id="5" name="body 5"/>
+          <p:cNvSpPr>
+            <a:spLocks noGrp="1"/>
+          </p:cNvSpPr>
+          <p:nvPr>
+            <p:ph type="body" idx="3"/>
+          </p:nvPr>
+        </p:nvSpPr>
+        <p:spPr/>
+        <p:txBody>
+          <a:bodyPr/>
+          <a:lstStyle/>
+          <a:p>
+            <a:r>
+              <a:rPr lang="en-US"/>
+              <a:t>{{course_date}}</a:t>
+            </a:r>
+          </a:p>
+        </p:txBody>
+      </p:sp>
     </p:spTree>
   </p:cSld>
   <p:clrMapOvr>
@@ -1582,6 +1795,28 @@
         <p:nvPr/>
       </p:nvGrpSpPr>
       <p:grpSpPr/>
+      <p:sp>
+        <p:nvSpPr>
+          <p:cNvPr id="2" name="body 2"/>
+          <p:cNvSpPr>
+            <a:spLocks noGrp="1"/>
+          </p:cNvSpPr>
+          <p:nvPr>
+            <p:ph type="body" idx="1"/>
+          </p:nvPr>
+        </p:nvSpPr>
+        <p:spPr/>
+        <p:txBody>
+          <a:bodyPr/>
+          <a:lstStyle/>
+          <a:p>
+            <a:r>
+              <a:rPr lang="en-US"/>
+              <a:t>{{big_text_content}}</a:t>
+            </a:r>
+          </a:p>
+        </p:txBody>
+      </p:sp>
     </p:spTree>
   </p:cSld>
   <p:clrMapOvr>
@@ -1600,6 +1835,50 @@
         <p:nvPr/>
       </p:nvGrpSpPr>
       <p:grpSpPr/>
+      <p:sp>
+        <p:nvSpPr>
+          <p:cNvPr id="2" name="title 2"/>
+          <p:cNvSpPr>
+            <a:spLocks noGrp="1"/>
+          </p:cNvSpPr>
+          <p:nvPr>
+            <p:ph type="title"/>
+          </p:nvPr>
+        </p:nvSpPr>
+        <p:spPr/>
+        <p:txBody>
+          <a:bodyPr/>
+          <a:lstStyle/>
+          <a:p>
+            <a:r>
+              <a:rPr lang="en-US"/>
+              <a:t>{{section_title}}</a:t>
+            </a:r>
+          </a:p>
+        </p:txBody>
+      </p:sp>
+      <p:sp>
+        <p:nvSpPr>
+          <p:cNvPr id="3" name="body 3"/>
+          <p:cNvSpPr>
+            <a:spLocks noGrp="1"/>
+          </p:cNvSpPr>
+          <p:nvPr>
+            <p:ph type="body" idx="1"/>
+          </p:nvPr>
+        </p:nvSpPr>
+        <p:spPr/>
+        <p:txBody>
+          <a:bodyPr/>
+          <a:lstStyle/>
+          <a:p>
+            <a:r>
+              <a:rPr lang="en-US"/>
+              <a:t>{{section_description}}</a:t>
+            </a:r>
+          </a:p>
+        </p:txBody>
+      </p:sp>
     </p:spTree>
   </p:cSld>
   <p:clrMapOvr>
@@ -1618,6 +1897,50 @@
         <p:nvPr/>
       </p:nvGrpSpPr>
       <p:grpSpPr/>
+      <p:sp>
+        <p:nvSpPr>
+          <p:cNvPr id="2" name="title 2"/>
+          <p:cNvSpPr>
+            <a:spLocks noGrp="1"/>
+          </p:cNvSpPr>
+          <p:nvPr>
+            <p:ph type="title"/>
+          </p:nvPr>
+        </p:nvSpPr>
+        <p:spPr/>
+        <p:txBody>
+          <a:bodyPr/>
+          <a:lstStyle/>
+          <a:p>
+            <a:r>
+              <a:rPr lang="en-US"/>
+              <a:t>{{slide_title}}</a:t>
+            </a:r>
+          </a:p>
+        </p:txBody>
+      </p:sp>
+      <p:sp>
+        <p:nvSpPr>
+          <p:cNvPr id="3" name="body 3"/>
+          <p:cNvSpPr>
+            <a:spLocks noGrp="1"/>
+          </p:cNvSpPr>
+          <p:nvPr>
+            <p:ph type="body" idx="1"/>
+          </p:nvPr>
+        </p:nvSpPr>
+        <p:spPr/>
+        <p:txBody>
+          <a:bodyPr/>
+          <a:lstStyle/>
+          <a:p>
+            <a:r>
+              <a:rPr lang="en-US"/>
+              <a:t>{{main_content}}</a:t>
+            </a:r>
+          </a:p>
+        </p:txBody>
+      </p:sp>
     </p:spTree>
   </p:cSld>
   <p:clrMapOvr>
@@ -1636,6 +1959,72 @@
         <p:nvPr/>
       </p:nvGrpSpPr>
       <p:grpSpPr/>
+      <p:sp>
+        <p:nvSpPr>
+          <p:cNvPr id="2" name="title 2"/>
+          <p:cNvSpPr>
+            <a:spLocks noGrp="1"/>
+          </p:cNvSpPr>
+          <p:nvPr>
+            <p:ph type="title"/>
+          </p:nvPr>
+        </p:nvSpPr>
+        <p:spPr/>
+        <p:txBody>
+          <a:bodyPr/>
+          <a:lstStyle/>
+          <a:p>
+            <a:r>
+              <a:rPr lang="en-US"/>
+              <a:t>{{slide_title}}</a:t>
+            </a:r>
+          </a:p>
+        </p:txBody>
+      </p:sp>
+      <p:sp>
+        <p:nvSpPr>
+          <p:cNvPr id="3" name="body 3"/>
+          <p:cNvSpPr>
+            <a:spLocks noGrp="1"/>
+          </p:cNvSpPr>
+          <p:nvPr>
+            <p:ph type="body" idx="1"/>
+          </p:nvPr>
+        </p:nvSpPr>
+        <p:spPr/>
+        <p:txBody>
+          <a:bodyPr/>
+          <a:lstStyle/>
+          <a:p>
+            <a:r>
+              <a:rPr lang="en-US"/>
+              <a:t>{{left_column}}</a:t>
+            </a:r>
+          </a:p>
+        </p:txBody>
+      </p:sp>
+      <p:sp>
+        <p:nvSpPr>
+          <p:cNvPr id="4" name="body 4"/>
+          <p:cNvSpPr>
+            <a:spLocks noGrp="1"/>
+          </p:cNvSpPr>
+          <p:nvPr>
+            <p:ph type="body" idx="2"/>
+          </p:nvPr>
+        </p:nvSpPr>
+        <p:spPr/>
+        <p:txBody>
+          <a:bodyPr/>
+          <a:lstStyle/>
+          <a:p>
+            <a:r>
+              <a:rPr lang="en-US"/>
+              <a:t>{{right_column}}</a:t>
+            </a:r>
+          </a:p>
+        </p:txBody>
+      </p:sp>
     </p:spTree>
   </p:cSld>
   <p:clrMapOvr>
@@ -1654,6 +2043,72 @@
         <p:nvPr/>
       </p:nvGrpSpPr>
       <p:grpSpPr/>
+      <p:sp>
+        <p:nvSpPr>
+          <p:cNvPr id="2" name="title 2"/>
+          <p:cNvSpPr>
+            <a:spLocks noGrp="1"/>
+          </p:cNvSpPr>
+          <p:nvPr>
+            <p:ph type="title"/>
+          </p:nvPr>
+        </p:nvSpPr>
+        <p:spPr/>
+        <p:txBody>
+          <a:bodyPr/>
+          <a:lstStyle/>
+          <a:p>
+            <a:r>
+              <a:rPr lang="en-US"/>
+              <a:t>{{competency_title}}</a:t>
+            </a:r>
+          </a:p>
+        </p:txBody>
+      </p:sp>
+      <p:sp>
+        <p:nvSpPr>
+          <p:cNvPr id="3" name="body 3"/>
+          <p:cNvSpPr>
+            <a:spLocks noGrp="1"/>
+          </p:cNvSpPr>
+          <p:nvPr>
+            <p:ph type="body" idx="1"/>
+          </p:nvPr>
+        </p:nvSpPr>
+        <p:spPr/>
+        <p:txBody>
+          <a:bodyPr/>
+          <a:lstStyle/>
+          <a:p>
+            <a:r>
+              <a:rPr lang="en-US"/>
+              <a:t>{{competency_description}}</a:t>
+            </a:r>
+          </a:p>
+        </p:txBody>
+      </p:sp>
+      <p:sp>
+        <p:nvSpPr>
+          <p:cNvPr id="4" name="body 4"/>
+          <p:cNvSpPr>
+            <a:spLocks noGrp="1"/>
+          </p:cNvSpPr>
+          <p:nvPr>
+            <p:ph type="body" idx="2"/>
+          </p:nvPr>
+        </p:nvSpPr>
+        <p:spPr/>
+        <p:txBody>
+          <a:bodyPr/>
+          <a:lstStyle/>
+          <a:p>
+            <a:r>
+              <a:rPr lang="en-US"/>
+              <a:t>{{learning_objectives}}</a:t>
+            </a:r>
+          </a:p>
+        </p:txBody>
+      </p:sp>
     </p:spTree>
   </p:cSld>
   <p:clrMapOvr>
@@ -1672,6 +2127,94 @@
         <p:nvPr/>
       </p:nvGrpSpPr>
       <p:grpSpPr/>
+      <p:sp>
+        <p:nvSpPr>
+          <p:cNvPr id="2" name="title 2"/>
+          <p:cNvSpPr>
+            <a:spLocks noGrp="1"/>
+          </p:cNvSpPr>
+          <p:nvPr>
+            <p:ph type="title"/>
+          </p:nvPr>
+        </p:nvSpPr>
+        <p:spPr/>
+        <p:txBody>
+          <a:bodyPr/>
+          <a:lstStyle/>
+          <a:p>
+            <a:r>
+              <a:rPr lang="en-US"/>
+              <a:t>{{activity_title}}</a:t>
+            </a:r>
+          </a:p>
+        </p:txBody>
+      </p:sp>
+      <p:sp>
+        <p:nvSpPr>
+          <p:cNvPr id="3" name="body 3"/>
+          <p:cNvSpPr>
+            <a:spLocks noGrp="1"/>
+          </p:cNvSpPr>
+          <p:nvPr>
+            <p:ph type="body" idx="1"/>
+          </p:nvPr>
+        </p:nvSpPr>
+        <p:spPr/>
+        <p:txBody>
+          <a:bodyPr/>
+          <a:lstStyle/>
+          <a:p>
+            <a:r>
+              <a:rPr lang="en-US"/>
+              <a:t>{{activity_instructions}}</a:t>
+            </a:r>
+          </a:p>
+        </p:txBody>
+      </p:sp>
+      <p:sp>
+        <p:nvSpPr>
+          <p:cNvPr id="4" name="body 4"/>
+          <p:cNvSpPr>
+            <a:spLocks noGrp="1"/>
+          </p:cNvSpPr>
+          <p:nvPr>
+            <p:ph type="body" idx="2"/>
+          </p:nvPr>
+        </p:nvSpPr>
+        <p:spPr/>
+        <p:txBody>
+          <a:bodyPr/>
+          <a:lstStyle/>
+          <a:p>
+            <a:r>
+              <a:rPr lang="en-US"/>
+              <a:t>{{time_estimate}} min</a:t>
+            </a:r>
+          </a:p>
+        </p:txBody>
+      </p:sp>
+      <p:sp>
+        <p:nvSpPr>
+          <p:cNvPr id="5" name="body 5"/>
+          <p:cNvSpPr>
+            <a:spLocks noGrp="1"/>
+          </p:cNvSpPr>
+          <p:nvPr>
+            <p:ph type="body" idx="3"/>
+          </p:nvPr>
+        </p:nvSpPr>
+        <p:spPr/>
+        <p:txBody>
+          <a:bodyPr/>
+          <a:lstStyle/>
+          <a:p>
+            <a:r>
+              <a:rPr lang="en-US"/>
+              <a:t>{{materials_needed}}</a:t>
+            </a:r>
+          </a:p>
+        </p:txBody>
+      </p:sp>
     </p:spTree>
   </p:cSld>
   <p:clrMapOvr>
@@ -1690,6 +2233,94 @@
         <p:nvPr/>
       </p:nvGrpSpPr>
       <p:grpSpPr/>
+      <p:sp>
+        <p:nvSpPr>
+          <p:cNvPr id="2" name="title 2"/>
+          <p:cNvSpPr>
+            <a:spLocks noGrp="1"/>
+          </p:cNvSpPr>
+          <p:nvPr>
+            <p:ph type="title"/>
+          </p:nvPr>
+        </p:nvSpPr>
+        <p:spPr/>
+        <p:txBody>
+          <a:bodyPr/>
+          <a:lstStyle/>
+          <a:p>
+            <a:r>
+              <a:rPr lang="en-US"/>
+              <a:t>Discussion</a:t>
+            </a:r>
+          </a:p>
+        </p:txBody>
+      </p:sp>
+      <p:sp>
+        <p:nvSpPr>
+          <p:cNvPr id="3" name="body 3"/>
+          <p:cNvSpPr>
+            <a:spLocks noGrp="1"/>
+          </p:cNvSpPr>
+          <p:nvPr>
+            <p:ph type="body" idx="1"/>
+          </p:nvPr>
+        </p:nvSpPr>
+        <p:spPr/>
+        <p:txBody>
+          <a:bodyPr/>
+          <a:lstStyle/>
+          <a:p>
+            <a:r>
+              <a:rPr lang="en-US"/>
+              <a:t>{{discussion_prompt}}</a:t>
+            </a:r>
+          </a:p>
+        </p:txBody>
+      </p:sp>
+      <p:sp>
+        <p:nvSpPr>
+          <p:cNvPr id="4" name="body 4"/>
+          <p:cNvSpPr>
+            <a:spLocks noGrp="1"/>
+          </p:cNvSpPr>
+          <p:nvPr>
+            <p:ph type="body" idx="2"/>
+          </p:nvPr>
+        </p:nvSpPr>
+        <p:spPr/>
+        <p:txBody>
+          <a:bodyPr/>
+          <a:lstStyle/>
+          <a:p>
+            <a:r>
+              <a:rPr lang="en-US"/>
+              <a:t>{{discussion_points}}</a:t>
+            </a:r>
+          </a:p>
+        </p:txBody>
+      </p:sp>
+      <p:sp>
+        <p:nvSpPr>
+          <p:cNvPr id="5" name="body 5"/>
+          <p:cNvSpPr>
+            <a:spLocks noGrp="1"/>
+          </p:cNvSpPr>
+          <p:nvPr>
+            <p:ph type="body" idx="3"/>
+          </p:nvPr>
+        </p:nvSpPr>
+        <p:spPr/>
+        <p:txBody>
+          <a:bodyPr/>
+          <a:lstStyle/>
+          <a:p>
+            <a:r>
+              <a:rPr lang="en-US"/>
+              <a:t>Teaching Notes: {{teaching_notes}}</a:t>
+            </a:r>
+          </a:p>
+        </p:txBody>
+      </p:sp>
     </p:spTree>
   </p:cSld>
   <p:clrMapOvr>
@@ -1708,6 +2339,50 @@
         <p:nvPr/>
       </p:nvGrpSpPr>
       <p:grpSpPr/>
+      <p:sp>
+        <p:nvSpPr>
+          <p:cNvPr id="2" name="body 2"/>
+          <p:cNvSpPr>
+            <a:spLocks noGrp="1"/>
+          </p:cNvSpPr>
+          <p:nvPr>
+            <p:ph type="body" idx="1"/>
+          </p:nvPr>
+        </p:nvSpPr>
+        <p:spPr/>
+        <p:txBody>
+          <a:bodyPr/>
+          <a:lstStyle/>
+          <a:p>
+            <a:r>
+              <a:rPr lang="en-US"/>
+              <a:t>{{quote_text}}</a:t>
+            </a:r>
+          </a:p>
+        </p:txBody>
+      </p:sp>
+      <p:sp>
+        <p:nvSpPr>
+          <p:cNvPr id="3" name="body 3"/>
+          <p:cNvSpPr>
+            <a:spLocks noGrp="1"/>
+          </p:cNvSpPr>
+          <p:nvPr>
+            <p:ph type="body" idx="2"/>
+          </p:nvPr>
+        </p:nvSpPr>
+        <p:spPr/>
+        <p:txBody>
+          <a:bodyPr/>
+          <a:lstStyle/>
+          <a:p>
+            <a:r>
+              <a:rPr lang="en-US"/>
+              <a:t>— {{attribution}}</a:t>
+            </a:r>
+          </a:p>
+        </p:txBody>
+      </p:sp>
     </p:spTree>
   </p:cSld>
   <p:clrMapOvr>
@@ -1726,6 +2401,50 @@
         <p:nvPr/>
       </p:nvGrpSpPr>
       <p:grpSpPr/>
+      <p:sp>
+        <p:nvSpPr>
+          <p:cNvPr id="2" name="pic 2"/>
+          <p:cNvSpPr>
+            <a:spLocks noGrp="1"/>
+          </p:cNvSpPr>
+          <p:nvPr>
+            <p:ph type="pic" idx="1"/>
+          </p:nvPr>
+        </p:nvSpPr>
+        <p:spPr/>
+        <p:txBody>
+          <a:bodyPr/>
+          <a:lstStyle/>
+          <a:p>
+            <a:r>
+              <a:rPr lang="en-US"/>
+              <a:t/>
+            </a:r>
+          </a:p>
+        </p:txBody>
+      </p:sp>
+      <p:sp>
+        <p:nvSpPr>
+          <p:cNvPr id="3" name="body 3"/>
+          <p:cNvSpPr>
+            <a:spLocks noGrp="1"/>
+          </p:cNvSpPr>
+          <p:nvPr>
+            <p:ph type="body" idx="2"/>
+          </p:nvPr>
+        </p:nvSpPr>
+        <p:spPr/>
+        <p:txBody>
+          <a:bodyPr/>
+          <a:lstStyle/>
+          <a:p>
+            <a:r>
+              <a:rPr lang="en-US"/>
+              <a:t>{{image_caption}}</a:t>
+            </a:r>
+          </a:p>
+        </p:txBody>
+      </p:sp>
     </p:spTree>
   </p:cSld>
   <p:clrMapOvr>

</xml_diff>